<commit_message>
created higher res images
</commit_message>
<xml_diff>
--- a/assets/img/Template for blog post cards.pptx
+++ b/assets/img/Template for blog post cards.pptx
@@ -108,6 +108,11 @@
       </a:defRPr>
     </a:lvl9pPr>
   </p:defaultTextStyle>
+  <p:extLst>
+    <p:ext uri="{EFAFB233-063F-42B5-8137-9DF3F51BA10A}">
+      <p15:sldGuideLst xmlns:p15="http://schemas.microsoft.com/office/powerpoint/2012/main"/>
+    </p:ext>
+  </p:extLst>
 </p:presentation>
 </file>
 
@@ -242,7 +247,7 @@
           <a:p>
             <a:fld id="{BB848D93-61F9-441F-8257-F28C49254038}" type="datetimeFigureOut">
               <a:rPr lang="en-US" smtClean="0"/>
-              <a:t>9/11/2020</a:t>
+              <a:t>9/13/2020</a:t>
             </a:fld>
             <a:endParaRPr lang="en-US"/>
           </a:p>
@@ -412,7 +417,7 @@
           <a:p>
             <a:fld id="{BB848D93-61F9-441F-8257-F28C49254038}" type="datetimeFigureOut">
               <a:rPr lang="en-US" smtClean="0"/>
-              <a:t>9/11/2020</a:t>
+              <a:t>9/13/2020</a:t>
             </a:fld>
             <a:endParaRPr lang="en-US"/>
           </a:p>
@@ -592,7 +597,7 @@
           <a:p>
             <a:fld id="{BB848D93-61F9-441F-8257-F28C49254038}" type="datetimeFigureOut">
               <a:rPr lang="en-US" smtClean="0"/>
-              <a:t>9/11/2020</a:t>
+              <a:t>9/13/2020</a:t>
             </a:fld>
             <a:endParaRPr lang="en-US"/>
           </a:p>
@@ -762,7 +767,7 @@
           <a:p>
             <a:fld id="{BB848D93-61F9-441F-8257-F28C49254038}" type="datetimeFigureOut">
               <a:rPr lang="en-US" smtClean="0"/>
-              <a:t>9/11/2020</a:t>
+              <a:t>9/13/2020</a:t>
             </a:fld>
             <a:endParaRPr lang="en-US"/>
           </a:p>
@@ -1006,7 +1011,7 @@
           <a:p>
             <a:fld id="{BB848D93-61F9-441F-8257-F28C49254038}" type="datetimeFigureOut">
               <a:rPr lang="en-US" smtClean="0"/>
-              <a:t>9/11/2020</a:t>
+              <a:t>9/13/2020</a:t>
             </a:fld>
             <a:endParaRPr lang="en-US"/>
           </a:p>
@@ -1238,7 +1243,7 @@
           <a:p>
             <a:fld id="{BB848D93-61F9-441F-8257-F28C49254038}" type="datetimeFigureOut">
               <a:rPr lang="en-US" smtClean="0"/>
-              <a:t>9/11/2020</a:t>
+              <a:t>9/13/2020</a:t>
             </a:fld>
             <a:endParaRPr lang="en-US"/>
           </a:p>
@@ -1605,7 +1610,7 @@
           <a:p>
             <a:fld id="{BB848D93-61F9-441F-8257-F28C49254038}" type="datetimeFigureOut">
               <a:rPr lang="en-US" smtClean="0"/>
-              <a:t>9/11/2020</a:t>
+              <a:t>9/13/2020</a:t>
             </a:fld>
             <a:endParaRPr lang="en-US"/>
           </a:p>
@@ -1723,7 +1728,7 @@
           <a:p>
             <a:fld id="{BB848D93-61F9-441F-8257-F28C49254038}" type="datetimeFigureOut">
               <a:rPr lang="en-US" smtClean="0"/>
-              <a:t>9/11/2020</a:t>
+              <a:t>9/13/2020</a:t>
             </a:fld>
             <a:endParaRPr lang="en-US"/>
           </a:p>
@@ -1818,7 +1823,7 @@
           <a:p>
             <a:fld id="{BB848D93-61F9-441F-8257-F28C49254038}" type="datetimeFigureOut">
               <a:rPr lang="en-US" smtClean="0"/>
-              <a:t>9/11/2020</a:t>
+              <a:t>9/13/2020</a:t>
             </a:fld>
             <a:endParaRPr lang="en-US"/>
           </a:p>
@@ -2095,7 +2100,7 @@
           <a:p>
             <a:fld id="{BB848D93-61F9-441F-8257-F28C49254038}" type="datetimeFigureOut">
               <a:rPr lang="en-US" smtClean="0"/>
-              <a:t>9/11/2020</a:t>
+              <a:t>9/13/2020</a:t>
             </a:fld>
             <a:endParaRPr lang="en-US"/>
           </a:p>
@@ -2352,7 +2357,7 @@
           <a:p>
             <a:fld id="{BB848D93-61F9-441F-8257-F28C49254038}" type="datetimeFigureOut">
               <a:rPr lang="en-US" smtClean="0"/>
-              <a:t>9/11/2020</a:t>
+              <a:t>9/13/2020</a:t>
             </a:fld>
             <a:endParaRPr lang="en-US"/>
           </a:p>
@@ -2565,7 +2570,7 @@
           <a:p>
             <a:fld id="{BB848D93-61F9-441F-8257-F28C49254038}" type="datetimeFigureOut">
               <a:rPr lang="en-US" smtClean="0"/>
-              <a:t>9/11/2020</a:t>
+              <a:t>9/13/2020</a:t>
             </a:fld>
             <a:endParaRPr lang="en-US"/>
           </a:p>
@@ -3843,7 +3848,7 @@
                   <a:srgbClr val="847986"/>
                 </a:solidFill>
               </a:rPr>
-              <a:t>Analyzing car accident data with MySQL for </a:t>
+              <a:t>Analyzed car accident data with MySQL for </a:t>
             </a:r>
             <a:br>
               <a:rPr lang="en-US" sz="1600" dirty="0">
@@ -4186,7 +4191,7 @@
                   <a:srgbClr val="847986"/>
                 </a:solidFill>
               </a:rPr>
-              <a:t>Using a logistic regression model to create a recommendation model </a:t>
+              <a:t>Used logistic regression to create a recommendation model </a:t>
             </a:r>
             <a:br>
               <a:rPr lang="en-US" sz="1600" dirty="0">

</xml_diff>